<commit_message>
Ajustes no slide e no arquivo de levantamento de requisitos
</commit_message>
<xml_diff>
--- a/Slide_sistema_de_controle_comercial_04_05.pptx
+++ b/Slide_sistema_de_controle_comercial_04_05.pptx
@@ -109,6 +109,11 @@
       </a:defRPr>
     </a:lvl9pPr>
   </p:defaultTextStyle>
+  <p:extLst>
+    <p:ext uri="{EFAFB233-063F-42B5-8137-9DF3F51BA10A}">
+      <p15:sldGuideLst xmlns:p15="http://schemas.microsoft.com/office/powerpoint/2012/main"/>
+    </p:ext>
+  </p:extLst>
 </p:presentation>
 </file>
 
@@ -186,7 +191,7 @@
           </a:lstStyle>
           <a:p>
             <a:r>
-              <a:rPr lang="pt-BR" smtClean="0"/>
+              <a:rPr lang="pt-BR"/>
               <a:t>Clique para editar o título mestre</a:t>
             </a:r>
             <a:endParaRPr lang="en-US" dirty="0"/>
@@ -253,7 +258,7 @@
           </a:lstStyle>
           <a:p>
             <a:r>
-              <a:rPr lang="pt-BR" smtClean="0"/>
+              <a:rPr lang="pt-BR"/>
               <a:t>Clique para editar o estilo do subtítulo Mestre</a:t>
             </a:r>
             <a:endParaRPr lang="en-US" dirty="0"/>
@@ -390,7 +395,7 @@
           </a:lstStyle>
           <a:p>
             <a:r>
-              <a:rPr lang="pt-BR" smtClean="0"/>
+              <a:rPr lang="pt-BR"/>
               <a:t>Clique para editar o título mestre</a:t>
             </a:r>
             <a:endParaRPr lang="en-US" dirty="0"/>
@@ -455,7 +460,7 @@
           </a:lstStyle>
           <a:p>
             <a:r>
-              <a:rPr lang="pt-BR" smtClean="0"/>
+              <a:rPr lang="pt-BR"/>
               <a:t>Clique no ícone para adicionar uma imagem</a:t>
             </a:r>
             <a:endParaRPr lang="en-US" dirty="0"/>
@@ -521,7 +526,7 @@
           <a:p>
             <a:pPr lvl="0"/>
             <a:r>
-              <a:rPr lang="pt-BR" smtClean="0"/>
+              <a:rPr lang="pt-BR"/>
               <a:t>Editar estilos de texto Mestre</a:t>
             </a:r>
           </a:p>
@@ -672,7 +677,7 @@
           </a:lstStyle>
           <a:p>
             <a:r>
-              <a:rPr lang="pt-BR" smtClean="0"/>
+              <a:rPr lang="pt-BR"/>
               <a:t>Clique para editar o título mestre</a:t>
             </a:r>
             <a:endParaRPr lang="en-US" dirty="0"/>
@@ -738,7 +743,7 @@
           <a:p>
             <a:pPr lvl="0"/>
             <a:r>
-              <a:rPr lang="pt-BR" smtClean="0"/>
+              <a:rPr lang="pt-BR"/>
               <a:t>Editar estilos de texto Mestre</a:t>
             </a:r>
           </a:p>
@@ -909,7 +914,7 @@
           </a:lstStyle>
           <a:p>
             <a:r>
-              <a:rPr lang="pt-BR" smtClean="0"/>
+              <a:rPr lang="pt-BR"/>
               <a:t>Clique para editar o título mestre</a:t>
             </a:r>
             <a:endParaRPr lang="en-US" dirty="0"/>
@@ -977,7 +982,7 @@
           <a:p>
             <a:pPr lvl="0"/>
             <a:r>
-              <a:rPr lang="pt-BR" smtClean="0"/>
+              <a:rPr lang="pt-BR"/>
               <a:t>Editar estilos de texto Mestre</a:t>
             </a:r>
           </a:p>
@@ -1044,7 +1049,7 @@
           <a:p>
             <a:pPr lvl="0"/>
             <a:r>
-              <a:rPr lang="pt-BR" smtClean="0"/>
+              <a:rPr lang="pt-BR"/>
               <a:t>Editar estilos de texto Mestre</a:t>
             </a:r>
           </a:p>
@@ -1447,7 +1452,7 @@
           </a:lstStyle>
           <a:p>
             <a:r>
-              <a:rPr lang="pt-BR" smtClean="0"/>
+              <a:rPr lang="pt-BR"/>
               <a:t>Clique para editar o título mestre</a:t>
             </a:r>
             <a:endParaRPr lang="en-US" dirty="0"/>
@@ -1513,7 +1518,7 @@
           <a:p>
             <a:pPr lvl="0"/>
             <a:r>
-              <a:rPr lang="pt-BR" smtClean="0"/>
+              <a:rPr lang="pt-BR"/>
               <a:t>Editar estilos de texto Mestre</a:t>
             </a:r>
           </a:p>
@@ -1650,7 +1655,7 @@
           <a:lstStyle/>
           <a:p>
             <a:r>
-              <a:rPr lang="pt-BR" smtClean="0"/>
+              <a:rPr lang="pt-BR"/>
               <a:t>Clique para editar o título mestre</a:t>
             </a:r>
             <a:endParaRPr lang="en-US" dirty="0"/>
@@ -1722,7 +1727,7 @@
           <a:p>
             <a:pPr lvl="0"/>
             <a:r>
-              <a:rPr lang="pt-BR" smtClean="0"/>
+              <a:rPr lang="pt-BR"/>
               <a:t>Editar estilos de texto Mestre</a:t>
             </a:r>
           </a:p>
@@ -1789,7 +1794,7 @@
           <a:p>
             <a:pPr lvl="0"/>
             <a:r>
-              <a:rPr lang="pt-BR" smtClean="0"/>
+              <a:rPr lang="pt-BR"/>
               <a:t>Editar estilos de texto Mestre</a:t>
             </a:r>
           </a:p>
@@ -1860,7 +1865,7 @@
           <a:p>
             <a:pPr lvl="0"/>
             <a:r>
-              <a:rPr lang="pt-BR" smtClean="0"/>
+              <a:rPr lang="pt-BR"/>
               <a:t>Editar estilos de texto Mestre</a:t>
             </a:r>
           </a:p>
@@ -1927,7 +1932,7 @@
           <a:p>
             <a:pPr lvl="0"/>
             <a:r>
-              <a:rPr lang="pt-BR" smtClean="0"/>
+              <a:rPr lang="pt-BR"/>
               <a:t>Editar estilos de texto Mestre</a:t>
             </a:r>
           </a:p>
@@ -1998,7 +2003,7 @@
           <a:p>
             <a:pPr lvl="0"/>
             <a:r>
-              <a:rPr lang="pt-BR" smtClean="0"/>
+              <a:rPr lang="pt-BR"/>
               <a:t>Editar estilos de texto Mestre</a:t>
             </a:r>
           </a:p>
@@ -2065,7 +2070,7 @@
           <a:p>
             <a:pPr lvl="0"/>
             <a:r>
-              <a:rPr lang="pt-BR" smtClean="0"/>
+              <a:rPr lang="pt-BR"/>
               <a:t>Editar estilos de texto Mestre</a:t>
             </a:r>
           </a:p>
@@ -2182,7 +2187,7 @@
           <a:lstStyle/>
           <a:p>
             <a:r>
-              <a:rPr lang="pt-BR" smtClean="0"/>
+              <a:rPr lang="pt-BR"/>
               <a:t>Clique para editar o título mestre</a:t>
             </a:r>
             <a:endParaRPr lang="en-US" dirty="0"/>
@@ -2254,7 +2259,7 @@
           <a:p>
             <a:pPr lvl="0"/>
             <a:r>
-              <a:rPr lang="pt-BR" smtClean="0"/>
+              <a:rPr lang="pt-BR"/>
               <a:t>Editar estilos de texto Mestre</a:t>
             </a:r>
           </a:p>
@@ -2332,7 +2337,7 @@
           </a:lstStyle>
           <a:p>
             <a:r>
-              <a:rPr lang="pt-BR" smtClean="0"/>
+              <a:rPr lang="pt-BR"/>
               <a:t>Clique no ícone para adicionar uma imagem</a:t>
             </a:r>
             <a:endParaRPr lang="en-US" dirty="0"/>
@@ -2400,7 +2405,7 @@
           <a:p>
             <a:pPr lvl="0"/>
             <a:r>
-              <a:rPr lang="pt-BR" smtClean="0"/>
+              <a:rPr lang="pt-BR"/>
               <a:t>Editar estilos de texto Mestre</a:t>
             </a:r>
           </a:p>
@@ -2471,7 +2476,7 @@
           <a:p>
             <a:pPr lvl="0"/>
             <a:r>
-              <a:rPr lang="pt-BR" smtClean="0"/>
+              <a:rPr lang="pt-BR"/>
               <a:t>Editar estilos de texto Mestre</a:t>
             </a:r>
           </a:p>
@@ -2549,7 +2554,7 @@
           </a:lstStyle>
           <a:p>
             <a:r>
-              <a:rPr lang="pt-BR" smtClean="0"/>
+              <a:rPr lang="pt-BR"/>
               <a:t>Clique no ícone para adicionar uma imagem</a:t>
             </a:r>
             <a:endParaRPr lang="en-US" dirty="0"/>
@@ -2617,7 +2622,7 @@
           <a:p>
             <a:pPr lvl="0"/>
             <a:r>
-              <a:rPr lang="pt-BR" smtClean="0"/>
+              <a:rPr lang="pt-BR"/>
               <a:t>Editar estilos de texto Mestre</a:t>
             </a:r>
           </a:p>
@@ -2688,7 +2693,7 @@
           <a:p>
             <a:pPr lvl="0"/>
             <a:r>
-              <a:rPr lang="pt-BR" smtClean="0"/>
+              <a:rPr lang="pt-BR"/>
               <a:t>Editar estilos de texto Mestre</a:t>
             </a:r>
           </a:p>
@@ -2766,7 +2771,7 @@
           </a:lstStyle>
           <a:p>
             <a:r>
-              <a:rPr lang="pt-BR" smtClean="0"/>
+              <a:rPr lang="pt-BR"/>
               <a:t>Clique no ícone para adicionar uma imagem</a:t>
             </a:r>
             <a:endParaRPr lang="en-US" dirty="0"/>
@@ -2834,7 +2839,7 @@
           <a:p>
             <a:pPr lvl="0"/>
             <a:r>
-              <a:rPr lang="pt-BR" smtClean="0"/>
+              <a:rPr lang="pt-BR"/>
               <a:t>Editar estilos de texto Mestre</a:t>
             </a:r>
           </a:p>
@@ -2946,7 +2951,7 @@
           <a:lstStyle/>
           <a:p>
             <a:r>
-              <a:rPr lang="pt-BR" smtClean="0"/>
+              <a:rPr lang="pt-BR"/>
               <a:t>Clique para editar o título mestre</a:t>
             </a:r>
             <a:endParaRPr lang="en-US" dirty="0"/>
@@ -2975,35 +2980,35 @@
           <a:p>
             <a:pPr lvl="0"/>
             <a:r>
-              <a:rPr lang="pt-BR" smtClean="0"/>
+              <a:rPr lang="pt-BR"/>
               <a:t>Editar estilos de texto Mestre</a:t>
             </a:r>
           </a:p>
           <a:p>
             <a:pPr lvl="1"/>
             <a:r>
-              <a:rPr lang="pt-BR" smtClean="0"/>
+              <a:rPr lang="pt-BR"/>
               <a:t>Segundo nível</a:t>
             </a:r>
           </a:p>
           <a:p>
             <a:pPr lvl="2"/>
             <a:r>
-              <a:rPr lang="pt-BR" smtClean="0"/>
+              <a:rPr lang="pt-BR"/>
               <a:t>Terceiro nível</a:t>
             </a:r>
           </a:p>
           <a:p>
             <a:pPr lvl="3"/>
             <a:r>
-              <a:rPr lang="pt-BR" smtClean="0"/>
+              <a:rPr lang="pt-BR"/>
               <a:t>Quarto nível</a:t>
             </a:r>
           </a:p>
           <a:p>
             <a:pPr lvl="4"/>
             <a:r>
-              <a:rPr lang="pt-BR" smtClean="0"/>
+              <a:rPr lang="pt-BR"/>
               <a:t>Quinto nível</a:t>
             </a:r>
             <a:endParaRPr lang="en-US" dirty="0"/>
@@ -3155,7 +3160,7 @@
           </a:lstStyle>
           <a:p>
             <a:r>
-              <a:rPr lang="pt-BR" smtClean="0"/>
+              <a:rPr lang="pt-BR"/>
               <a:t>Clique para editar o título mestre</a:t>
             </a:r>
             <a:endParaRPr lang="en-US" dirty="0"/>
@@ -3184,35 +3189,35 @@
           <a:p>
             <a:pPr lvl="0"/>
             <a:r>
-              <a:rPr lang="pt-BR" smtClean="0"/>
+              <a:rPr lang="pt-BR"/>
               <a:t>Editar estilos de texto Mestre</a:t>
             </a:r>
           </a:p>
           <a:p>
             <a:pPr lvl="1"/>
             <a:r>
-              <a:rPr lang="pt-BR" smtClean="0"/>
+              <a:rPr lang="pt-BR"/>
               <a:t>Segundo nível</a:t>
             </a:r>
           </a:p>
           <a:p>
             <a:pPr lvl="2"/>
             <a:r>
-              <a:rPr lang="pt-BR" smtClean="0"/>
+              <a:rPr lang="pt-BR"/>
               <a:t>Terceiro nível</a:t>
             </a:r>
           </a:p>
           <a:p>
             <a:pPr lvl="3"/>
             <a:r>
-              <a:rPr lang="pt-BR" smtClean="0"/>
+              <a:rPr lang="pt-BR"/>
               <a:t>Quarto nível</a:t>
             </a:r>
           </a:p>
           <a:p>
             <a:pPr lvl="4"/>
             <a:r>
-              <a:rPr lang="pt-BR" smtClean="0"/>
+              <a:rPr lang="pt-BR"/>
               <a:t>Quinto nível</a:t>
             </a:r>
             <a:endParaRPr lang="en-US" dirty="0"/>
@@ -3345,7 +3350,7 @@
           <a:lstStyle/>
           <a:p>
             <a:r>
-              <a:rPr lang="pt-BR" smtClean="0"/>
+              <a:rPr lang="pt-BR"/>
               <a:t>Clique para editar o título mestre</a:t>
             </a:r>
             <a:endParaRPr lang="en-US" dirty="0"/>
@@ -3369,35 +3374,35 @@
           <a:p>
             <a:pPr lvl="0"/>
             <a:r>
-              <a:rPr lang="pt-BR" smtClean="0"/>
+              <a:rPr lang="pt-BR"/>
               <a:t>Editar estilos de texto Mestre</a:t>
             </a:r>
           </a:p>
           <a:p>
             <a:pPr lvl="1"/>
             <a:r>
-              <a:rPr lang="pt-BR" smtClean="0"/>
+              <a:rPr lang="pt-BR"/>
               <a:t>Segundo nível</a:t>
             </a:r>
           </a:p>
           <a:p>
             <a:pPr lvl="2"/>
             <a:r>
-              <a:rPr lang="pt-BR" smtClean="0"/>
+              <a:rPr lang="pt-BR"/>
               <a:t>Terceiro nível</a:t>
             </a:r>
           </a:p>
           <a:p>
             <a:pPr lvl="3"/>
             <a:r>
-              <a:rPr lang="pt-BR" smtClean="0"/>
+              <a:rPr lang="pt-BR"/>
               <a:t>Quarto nível</a:t>
             </a:r>
           </a:p>
           <a:p>
             <a:pPr lvl="4"/>
             <a:r>
-              <a:rPr lang="pt-BR" smtClean="0"/>
+              <a:rPr lang="pt-BR"/>
               <a:t>Quinto nível</a:t>
             </a:r>
             <a:endParaRPr lang="en-US" dirty="0"/>
@@ -3551,7 +3556,7 @@
           </a:lstStyle>
           <a:p>
             <a:r>
-              <a:rPr lang="pt-BR" smtClean="0"/>
+              <a:rPr lang="pt-BR"/>
               <a:t>Clique para editar o título mestre</a:t>
             </a:r>
             <a:endParaRPr lang="en-US" dirty="0"/>
@@ -3673,7 +3678,7 @@
           <a:p>
             <a:pPr lvl="0"/>
             <a:r>
-              <a:rPr lang="pt-BR" smtClean="0"/>
+              <a:rPr lang="pt-BR"/>
               <a:t>Editar estilos de texto Mestre</a:t>
             </a:r>
           </a:p>
@@ -3805,7 +3810,7 @@
           <a:lstStyle/>
           <a:p>
             <a:r>
-              <a:rPr lang="pt-BR" smtClean="0"/>
+              <a:rPr lang="pt-BR"/>
               <a:t>Clique para editar o título mestre</a:t>
             </a:r>
             <a:endParaRPr lang="en-US" dirty="0"/>
@@ -3834,35 +3839,35 @@
           <a:p>
             <a:pPr lvl="0"/>
             <a:r>
-              <a:rPr lang="pt-BR" smtClean="0"/>
+              <a:rPr lang="pt-BR"/>
               <a:t>Editar estilos de texto Mestre</a:t>
             </a:r>
           </a:p>
           <a:p>
             <a:pPr lvl="1"/>
             <a:r>
-              <a:rPr lang="pt-BR" smtClean="0"/>
+              <a:rPr lang="pt-BR"/>
               <a:t>Segundo nível</a:t>
             </a:r>
           </a:p>
           <a:p>
             <a:pPr lvl="2"/>
             <a:r>
-              <a:rPr lang="pt-BR" smtClean="0"/>
+              <a:rPr lang="pt-BR"/>
               <a:t>Terceiro nível</a:t>
             </a:r>
           </a:p>
           <a:p>
             <a:pPr lvl="3"/>
             <a:r>
-              <a:rPr lang="pt-BR" smtClean="0"/>
+              <a:rPr lang="pt-BR"/>
               <a:t>Quarto nível</a:t>
             </a:r>
           </a:p>
           <a:p>
             <a:pPr lvl="4"/>
             <a:r>
-              <a:rPr lang="pt-BR" smtClean="0"/>
+              <a:rPr lang="pt-BR"/>
               <a:t>Quinto nível</a:t>
             </a:r>
             <a:endParaRPr lang="en-US" dirty="0"/>
@@ -3891,35 +3896,35 @@
           <a:p>
             <a:pPr lvl="0"/>
             <a:r>
-              <a:rPr lang="pt-BR" smtClean="0"/>
+              <a:rPr lang="pt-BR"/>
               <a:t>Editar estilos de texto Mestre</a:t>
             </a:r>
           </a:p>
           <a:p>
             <a:pPr lvl="1"/>
             <a:r>
-              <a:rPr lang="pt-BR" smtClean="0"/>
+              <a:rPr lang="pt-BR"/>
               <a:t>Segundo nível</a:t>
             </a:r>
           </a:p>
           <a:p>
             <a:pPr lvl="2"/>
             <a:r>
-              <a:rPr lang="pt-BR" smtClean="0"/>
+              <a:rPr lang="pt-BR"/>
               <a:t>Terceiro nível</a:t>
             </a:r>
           </a:p>
           <a:p>
             <a:pPr lvl="3"/>
             <a:r>
-              <a:rPr lang="pt-BR" smtClean="0"/>
+              <a:rPr lang="pt-BR"/>
               <a:t>Quarto nível</a:t>
             </a:r>
           </a:p>
           <a:p>
             <a:pPr lvl="4"/>
             <a:r>
-              <a:rPr lang="pt-BR" smtClean="0"/>
+              <a:rPr lang="pt-BR"/>
               <a:t>Quinto nível</a:t>
             </a:r>
             <a:endParaRPr lang="en-US" dirty="0"/>
@@ -4037,7 +4042,7 @@
           <a:lstStyle/>
           <a:p>
             <a:r>
-              <a:rPr lang="pt-BR" smtClean="0"/>
+              <a:rPr lang="pt-BR"/>
               <a:t>Clique para editar o título mestre</a:t>
             </a:r>
             <a:endParaRPr lang="en-US" dirty="0"/>
@@ -4109,7 +4114,7 @@
           <a:p>
             <a:pPr lvl="0"/>
             <a:r>
-              <a:rPr lang="pt-BR" smtClean="0"/>
+              <a:rPr lang="pt-BR"/>
               <a:t>Editar estilos de texto Mestre</a:t>
             </a:r>
           </a:p>
@@ -4137,35 +4142,35 @@
           <a:p>
             <a:pPr lvl="0"/>
             <a:r>
-              <a:rPr lang="pt-BR" smtClean="0"/>
+              <a:rPr lang="pt-BR"/>
               <a:t>Editar estilos de texto Mestre</a:t>
             </a:r>
           </a:p>
           <a:p>
             <a:pPr lvl="1"/>
             <a:r>
-              <a:rPr lang="pt-BR" smtClean="0"/>
+              <a:rPr lang="pt-BR"/>
               <a:t>Segundo nível</a:t>
             </a:r>
           </a:p>
           <a:p>
             <a:pPr lvl="2"/>
             <a:r>
-              <a:rPr lang="pt-BR" smtClean="0"/>
+              <a:rPr lang="pt-BR"/>
               <a:t>Terceiro nível</a:t>
             </a:r>
           </a:p>
           <a:p>
             <a:pPr lvl="3"/>
             <a:r>
-              <a:rPr lang="pt-BR" smtClean="0"/>
+              <a:rPr lang="pt-BR"/>
               <a:t>Quarto nível</a:t>
             </a:r>
           </a:p>
           <a:p>
             <a:pPr lvl="4"/>
             <a:r>
-              <a:rPr lang="pt-BR" smtClean="0"/>
+              <a:rPr lang="pt-BR"/>
               <a:t>Quinto nível</a:t>
             </a:r>
             <a:endParaRPr lang="en-US" dirty="0"/>
@@ -4237,7 +4242,7 @@
           <a:p>
             <a:pPr lvl="0"/>
             <a:r>
-              <a:rPr lang="pt-BR" smtClean="0"/>
+              <a:rPr lang="pt-BR"/>
               <a:t>Editar estilos de texto Mestre</a:t>
             </a:r>
           </a:p>
@@ -4265,35 +4270,35 @@
           <a:p>
             <a:pPr lvl="0"/>
             <a:r>
-              <a:rPr lang="pt-BR" smtClean="0"/>
+              <a:rPr lang="pt-BR"/>
               <a:t>Editar estilos de texto Mestre</a:t>
             </a:r>
           </a:p>
           <a:p>
             <a:pPr lvl="1"/>
             <a:r>
-              <a:rPr lang="pt-BR" smtClean="0"/>
+              <a:rPr lang="pt-BR"/>
               <a:t>Segundo nível</a:t>
             </a:r>
           </a:p>
           <a:p>
             <a:pPr lvl="2"/>
             <a:r>
-              <a:rPr lang="pt-BR" smtClean="0"/>
+              <a:rPr lang="pt-BR"/>
               <a:t>Terceiro nível</a:t>
             </a:r>
           </a:p>
           <a:p>
             <a:pPr lvl="3"/>
             <a:r>
-              <a:rPr lang="pt-BR" smtClean="0"/>
+              <a:rPr lang="pt-BR"/>
               <a:t>Quarto nível</a:t>
             </a:r>
           </a:p>
           <a:p>
             <a:pPr lvl="4"/>
             <a:r>
-              <a:rPr lang="pt-BR" smtClean="0"/>
+              <a:rPr lang="pt-BR"/>
               <a:t>Quinto nível</a:t>
             </a:r>
             <a:endParaRPr lang="en-US" dirty="0"/>
@@ -4406,7 +4411,7 @@
           <a:lstStyle/>
           <a:p>
             <a:r>
-              <a:rPr lang="pt-BR" smtClean="0"/>
+              <a:rPr lang="pt-BR"/>
               <a:t>Clique para editar o título mestre</a:t>
             </a:r>
             <a:endParaRPr lang="en-US" dirty="0"/>
@@ -4618,7 +4623,7 @@
           </a:lstStyle>
           <a:p>
             <a:r>
-              <a:rPr lang="pt-BR" smtClean="0"/>
+              <a:rPr lang="pt-BR"/>
               <a:t>Clique para editar o título mestre</a:t>
             </a:r>
             <a:endParaRPr lang="en-US" dirty="0"/>
@@ -4647,35 +4652,35 @@
           <a:p>
             <a:pPr lvl="0"/>
             <a:r>
-              <a:rPr lang="pt-BR" smtClean="0"/>
+              <a:rPr lang="pt-BR"/>
               <a:t>Editar estilos de texto Mestre</a:t>
             </a:r>
           </a:p>
           <a:p>
             <a:pPr lvl="1"/>
             <a:r>
-              <a:rPr lang="pt-BR" smtClean="0"/>
+              <a:rPr lang="pt-BR"/>
               <a:t>Segundo nível</a:t>
             </a:r>
           </a:p>
           <a:p>
             <a:pPr lvl="2"/>
             <a:r>
-              <a:rPr lang="pt-BR" smtClean="0"/>
+              <a:rPr lang="pt-BR"/>
               <a:t>Terceiro nível</a:t>
             </a:r>
           </a:p>
           <a:p>
             <a:pPr lvl="3"/>
             <a:r>
-              <a:rPr lang="pt-BR" smtClean="0"/>
+              <a:rPr lang="pt-BR"/>
               <a:t>Quarto nível</a:t>
             </a:r>
           </a:p>
           <a:p>
             <a:pPr lvl="4"/>
             <a:r>
-              <a:rPr lang="pt-BR" smtClean="0"/>
+              <a:rPr lang="pt-BR"/>
               <a:t>Quinto nível</a:t>
             </a:r>
             <a:endParaRPr lang="en-US" dirty="0"/>
@@ -4741,7 +4746,7 @@
           <a:p>
             <a:pPr lvl="0"/>
             <a:r>
-              <a:rPr lang="pt-BR" smtClean="0"/>
+              <a:rPr lang="pt-BR"/>
               <a:t>Editar estilos de texto Mestre</a:t>
             </a:r>
           </a:p>
@@ -4862,7 +4867,7 @@
           </a:lstStyle>
           <a:p>
             <a:r>
-              <a:rPr lang="pt-BR" smtClean="0"/>
+              <a:rPr lang="pt-BR"/>
               <a:t>Clique para editar o título mestre</a:t>
             </a:r>
             <a:endParaRPr lang="en-US" dirty="0"/>
@@ -4927,7 +4932,7 @@
           </a:lstStyle>
           <a:p>
             <a:r>
-              <a:rPr lang="pt-BR" smtClean="0"/>
+              <a:rPr lang="pt-BR"/>
               <a:t>Clique no ícone para adicionar uma imagem</a:t>
             </a:r>
             <a:endParaRPr lang="en-US" dirty="0"/>
@@ -4993,7 +4998,7 @@
           <a:p>
             <a:pPr lvl="0"/>
             <a:r>
-              <a:rPr lang="pt-BR" smtClean="0"/>
+              <a:rPr lang="pt-BR"/>
               <a:t>Editar estilos de texto Mestre</a:t>
             </a:r>
           </a:p>
@@ -5150,7 +5155,7 @@
           <a:lstStyle/>
           <a:p>
             <a:r>
-              <a:rPr lang="pt-BR" smtClean="0"/>
+              <a:rPr lang="pt-BR"/>
               <a:t>Clique para editar o título mestre</a:t>
             </a:r>
             <a:endParaRPr lang="en-US" dirty="0"/>
@@ -5184,35 +5189,35 @@
           <a:p>
             <a:pPr lvl="0"/>
             <a:r>
-              <a:rPr lang="pt-BR" smtClean="0"/>
+              <a:rPr lang="pt-BR"/>
               <a:t>Editar estilos de texto Mestre</a:t>
             </a:r>
           </a:p>
           <a:p>
             <a:pPr lvl="1"/>
             <a:r>
-              <a:rPr lang="pt-BR" smtClean="0"/>
+              <a:rPr lang="pt-BR"/>
               <a:t>Segundo nível</a:t>
             </a:r>
           </a:p>
           <a:p>
             <a:pPr lvl="2"/>
             <a:r>
-              <a:rPr lang="pt-BR" smtClean="0"/>
+              <a:rPr lang="pt-BR"/>
               <a:t>Terceiro nível</a:t>
             </a:r>
           </a:p>
           <a:p>
             <a:pPr lvl="3"/>
             <a:r>
-              <a:rPr lang="pt-BR" smtClean="0"/>
+              <a:rPr lang="pt-BR"/>
               <a:t>Quarto nível</a:t>
             </a:r>
           </a:p>
           <a:p>
             <a:pPr lvl="4"/>
             <a:r>
-              <a:rPr lang="pt-BR" smtClean="0"/>
+              <a:rPr lang="pt-BR"/>
               <a:t>Quinto nível</a:t>
             </a:r>
             <a:endParaRPr lang="en-US" dirty="0"/>
@@ -5678,10 +5683,9 @@
           <a:lstStyle/>
           <a:p>
             <a:r>
-              <a:rPr lang="pt-BR" dirty="0" smtClean="0"/>
+              <a:rPr lang="pt-BR" dirty="0"/>
               <a:t>SISTEMA DE CONTROLE COMERCIAL</a:t>
             </a:r>
-            <a:endParaRPr lang="pt-BR" dirty="0"/>
           </a:p>
         </p:txBody>
       </p:sp>
@@ -5708,34 +5712,33 @@
           <a:lstStyle/>
           <a:p>
             <a:r>
-              <a:rPr lang="pt-BR" sz="3600" dirty="0" smtClean="0"/>
+              <a:rPr lang="pt-BR" sz="3600" dirty="0"/>
               <a:t>Dot-Coders</a:t>
             </a:r>
           </a:p>
           <a:p>
             <a:r>
-              <a:rPr lang="pt-BR" sz="1800" dirty="0" smtClean="0"/>
+              <a:rPr lang="pt-BR" sz="1800" dirty="0"/>
               <a:t>Igor Sales</a:t>
             </a:r>
           </a:p>
           <a:p>
             <a:r>
-              <a:rPr lang="pt-BR" sz="1800" dirty="0" smtClean="0"/>
+              <a:rPr lang="pt-BR" sz="1800" dirty="0"/>
               <a:t>Rodrigo Andrade</a:t>
             </a:r>
           </a:p>
           <a:p>
             <a:r>
-              <a:rPr lang="pt-BR" sz="1800" dirty="0" smtClean="0"/>
+              <a:rPr lang="pt-BR" sz="1800" dirty="0"/>
               <a:t>Antônio Marcos Macedo</a:t>
             </a:r>
-            <a:endParaRPr lang="pt-BR" sz="1800" dirty="0"/>
           </a:p>
           <a:p>
             <a:endParaRPr lang="pt-BR" dirty="0"/>
           </a:p>
           <a:p>
-            <a:endParaRPr lang="pt-BR" dirty="0" smtClean="0"/>
+            <a:endParaRPr lang="pt-BR" dirty="0"/>
           </a:p>
         </p:txBody>
       </p:sp>
@@ -5785,10 +5788,9 @@
           <a:lstStyle/>
           <a:p>
             <a:r>
-              <a:rPr lang="pt-BR" dirty="0" smtClean="0"/>
+              <a:rPr lang="pt-BR" dirty="0"/>
               <a:t>Roteiro de organização	</a:t>
             </a:r>
-            <a:endParaRPr lang="pt-BR" dirty="0"/>
           </a:p>
         </p:txBody>
       </p:sp>
@@ -5808,44 +5810,52 @@
           <a:lstStyle/>
           <a:p>
             <a:r>
-              <a:rPr lang="pt-BR" dirty="0" smtClean="0"/>
+              <a:rPr lang="pt-BR" dirty="0"/>
               <a:t>Organização do </a:t>
             </a:r>
             <a:r>
-              <a:rPr lang="pt-BR" dirty="0" err="1" smtClean="0"/>
+              <a:rPr lang="pt-BR" i="1" dirty="0" err="1"/>
               <a:t>Trello</a:t>
             </a:r>
             <a:r>
-              <a:rPr lang="pt-BR" dirty="0" smtClean="0"/>
+              <a:rPr lang="pt-BR" dirty="0"/>
               <a:t>	</a:t>
             </a:r>
           </a:p>
           <a:p>
             <a:r>
-              <a:rPr lang="pt-BR" dirty="0" smtClean="0"/>
+              <a:rPr lang="pt-BR" dirty="0"/>
               <a:t>Organização do </a:t>
             </a:r>
             <a:r>
-              <a:rPr lang="pt-BR" dirty="0" err="1" smtClean="0"/>
+              <a:rPr lang="pt-BR" i="1" dirty="0" err="1"/>
               <a:t>Backlog</a:t>
             </a:r>
-            <a:endParaRPr lang="pt-BR" dirty="0" smtClean="0"/>
-          </a:p>
-          <a:p>
-            <a:r>
-              <a:rPr lang="pt-BR" dirty="0" smtClean="0"/>
-              <a:t>Adicionar mais atividades na Sprint por causa do atraso</a:t>
-            </a:r>
-          </a:p>
-          <a:p>
-            <a:r>
-              <a:rPr lang="pt-BR" dirty="0" smtClean="0"/>
+            <a:endParaRPr lang="pt-BR" i="1" dirty="0"/>
+          </a:p>
+          <a:p>
+            <a:r>
+              <a:rPr lang="pt-BR" dirty="0"/>
+              <a:t>Acréscimo de atividades na </a:t>
+            </a:r>
+            <a:r>
+              <a:rPr lang="pt-BR" i="1" dirty="0"/>
+              <a:t>Sprint</a:t>
+            </a:r>
+            <a:r>
+              <a:rPr lang="pt-BR" dirty="0"/>
+              <a:t> devido o atraso ocasionado pela anterior</a:t>
+            </a:r>
+          </a:p>
+          <a:p>
+            <a:r>
+              <a:rPr lang="pt-BR" dirty="0"/>
               <a:t>Retificação do diagrama de classe</a:t>
             </a:r>
           </a:p>
           <a:p>
             <a:r>
-              <a:rPr lang="pt-BR" dirty="0" smtClean="0"/>
+              <a:rPr lang="pt-BR" dirty="0"/>
               <a:t>Levantamento de requisitos funcionais e não funcionais a partir do diagrama de classe</a:t>
             </a:r>
           </a:p>
@@ -5900,10 +5910,9 @@
           <a:lstStyle/>
           <a:p>
             <a:r>
-              <a:rPr lang="pt-BR" dirty="0" smtClean="0"/>
+              <a:rPr lang="pt-BR" dirty="0"/>
               <a:t>Diagrama de classe	</a:t>
             </a:r>
-            <a:endParaRPr lang="pt-BR" dirty="0"/>
           </a:p>
         </p:txBody>
       </p:sp>
@@ -5989,10 +5998,9 @@
           <a:lstStyle/>
           <a:p>
             <a:r>
-              <a:rPr lang="pt-BR" dirty="0" smtClean="0"/>
+              <a:rPr lang="pt-BR" dirty="0"/>
               <a:t>Demonstração de alguns requisitos funcionais encontrados</a:t>
             </a:r>
-            <a:endParaRPr lang="pt-BR" dirty="0"/>
           </a:p>
         </p:txBody>
       </p:sp>
@@ -6006,14 +6014,14 @@
             <p:ph idx="1"/>
             <p:extLst>
               <p:ext uri="{D42A27DB-BD31-4B8C-83A1-F6EECF244321}">
-                <p14:modId xmlns:p14="http://schemas.microsoft.com/office/powerpoint/2010/main" val="11054889"/>
+                <p14:modId xmlns:p14="http://schemas.microsoft.com/office/powerpoint/2010/main" val="3397232110"/>
               </p:ext>
             </p:extLst>
           </p:nvPr>
         </p:nvGraphicFramePr>
         <p:xfrm>
           <a:off x="685800" y="2103120"/>
-          <a:ext cx="10820400" cy="4754880"/>
+          <a:ext cx="10820400" cy="4114800"/>
         </p:xfrm>
         <a:graphic>
           <a:graphicData uri="http://schemas.openxmlformats.org/drawingml/2006/table">
@@ -6044,10 +6052,9 @@
                     <a:lstStyle/>
                     <a:p>
                       <a:r>
-                        <a:rPr lang="pt-BR" dirty="0" smtClean="0"/>
+                        <a:rPr lang="pt-BR" dirty="0"/>
                         <a:t>RF01</a:t>
                       </a:r>
-                      <a:endParaRPr lang="pt-BR" dirty="0"/>
                     </a:p>
                   </a:txBody>
                   <a:tcPr/>
@@ -6075,7 +6082,7 @@
                         <a:defRPr/>
                       </a:pPr>
                       <a:r>
-                        <a:rPr lang="pt-BR" sz="1800" b="1" kern="1200" dirty="0" smtClean="0">
+                        <a:rPr lang="pt-BR" sz="1800" b="1" kern="1200" dirty="0">
                           <a:solidFill>
                             <a:schemeClr val="lt1"/>
                           </a:solidFill>
@@ -6103,10 +6110,9 @@
                     <a:lstStyle/>
                     <a:p>
                       <a:r>
-                        <a:rPr lang="pt-BR" dirty="0" smtClean="0"/>
+                        <a:rPr lang="pt-BR" dirty="0"/>
                         <a:t>RF01</a:t>
                       </a:r>
-                      <a:endParaRPr lang="pt-BR" dirty="0"/>
                     </a:p>
                   </a:txBody>
                   <a:tcPr/>
@@ -6117,7 +6123,7 @@
                     <a:lstStyle/>
                     <a:p>
                       <a:r>
-                        <a:rPr lang="pt-BR" sz="1800" kern="1200" dirty="0" smtClean="0">
+                        <a:rPr lang="pt-BR" sz="1800" kern="1200" dirty="0">
                           <a:solidFill>
                             <a:schemeClr val="dk1"/>
                           </a:solidFill>
@@ -6146,10 +6152,9 @@
                     <a:lstStyle/>
                     <a:p>
                       <a:r>
-                        <a:rPr lang="pt-BR" dirty="0" smtClean="0"/>
+                        <a:rPr lang="pt-BR" dirty="0"/>
                         <a:t>RF02</a:t>
                       </a:r>
-                      <a:endParaRPr lang="pt-BR" dirty="0"/>
                     </a:p>
                   </a:txBody>
                   <a:tcPr/>
@@ -6160,7 +6165,7 @@
                     <a:lstStyle/>
                     <a:p>
                       <a:r>
-                        <a:rPr lang="pt-BR" sz="1800" kern="1200" dirty="0" smtClean="0">
+                        <a:rPr lang="pt-BR" sz="1800" kern="1200" dirty="0">
                           <a:solidFill>
                             <a:schemeClr val="dk1"/>
                           </a:solidFill>
@@ -6189,10 +6194,9 @@
                     <a:lstStyle/>
                     <a:p>
                       <a:r>
-                        <a:rPr lang="pt-BR" dirty="0" smtClean="0"/>
+                        <a:rPr lang="pt-BR" dirty="0"/>
                         <a:t>RF04</a:t>
                       </a:r>
-                      <a:endParaRPr lang="pt-BR" dirty="0"/>
                     </a:p>
                   </a:txBody>
                   <a:tcPr/>
@@ -6203,7 +6207,7 @@
                     <a:lstStyle/>
                     <a:p>
                       <a:r>
-                        <a:rPr lang="pt-BR" sz="1800" kern="1200" dirty="0" smtClean="0">
+                        <a:rPr lang="pt-BR" sz="1800" kern="1200" dirty="0">
                           <a:solidFill>
                             <a:schemeClr val="dk1"/>
                           </a:solidFill>
@@ -6215,7 +6219,7 @@
                         <a:t>Os códigos do produto serão gerados automaticamente pelo sistema e serão utilizados como </a:t>
                       </a:r>
                       <a:r>
-                        <a:rPr lang="pt-BR" sz="1800" i="1" kern="1200" dirty="0" err="1" smtClean="0">
+                        <a:rPr lang="pt-BR" sz="1800" i="1" kern="1200" dirty="0" err="1">
                           <a:solidFill>
                             <a:schemeClr val="dk1"/>
                           </a:solidFill>
@@ -6227,7 +6231,7 @@
                         <a:t>primary</a:t>
                       </a:r>
                       <a:r>
-                        <a:rPr lang="pt-BR" sz="1800" i="1" kern="1200" dirty="0" smtClean="0">
+                        <a:rPr lang="pt-BR" sz="1800" i="1" kern="1200" dirty="0">
                           <a:solidFill>
                             <a:schemeClr val="dk1"/>
                           </a:solidFill>
@@ -6239,7 +6243,7 @@
                         <a:t> </a:t>
                       </a:r>
                       <a:r>
-                        <a:rPr lang="pt-BR" sz="1800" i="1" kern="1200" dirty="0" err="1" smtClean="0">
+                        <a:rPr lang="pt-BR" sz="1800" i="1" kern="1200" dirty="0" err="1">
                           <a:solidFill>
                             <a:schemeClr val="dk1"/>
                           </a:solidFill>
@@ -6251,7 +6255,7 @@
                         <a:t>key</a:t>
                       </a:r>
                       <a:r>
-                        <a:rPr lang="pt-BR" sz="1800" kern="1200" dirty="0" smtClean="0">
+                        <a:rPr lang="pt-BR" sz="1800" kern="1200" dirty="0">
                           <a:solidFill>
                             <a:schemeClr val="dk1"/>
                           </a:solidFill>
@@ -6280,10 +6284,9 @@
                     <a:lstStyle/>
                     <a:p>
                       <a:r>
-                        <a:rPr lang="pt-BR" dirty="0" smtClean="0"/>
+                        <a:rPr lang="pt-BR" dirty="0"/>
                         <a:t>RF05</a:t>
                       </a:r>
-                      <a:endParaRPr lang="pt-BR" dirty="0"/>
                     </a:p>
                   </a:txBody>
                   <a:tcPr/>
@@ -6294,7 +6297,7 @@
                     <a:lstStyle/>
                     <a:p>
                       <a:r>
-                        <a:rPr lang="pt-BR" sz="1800" kern="1200" dirty="0" smtClean="0">
+                        <a:rPr lang="pt-BR" sz="1800" kern="1200" dirty="0">
                           <a:solidFill>
                             <a:schemeClr val="dk1"/>
                           </a:solidFill>
@@ -6306,7 +6309,7 @@
                         <a:t>Os códigos do fornecedor serão gerados automaticamente pelo sistema e serão utilizados como </a:t>
                       </a:r>
                       <a:r>
-                        <a:rPr lang="pt-BR" sz="1800" i="1" kern="1200" dirty="0" err="1" smtClean="0">
+                        <a:rPr lang="pt-BR" sz="1800" i="1" kern="1200" dirty="0" err="1">
                           <a:solidFill>
                             <a:schemeClr val="dk1"/>
                           </a:solidFill>
@@ -6318,7 +6321,7 @@
                         <a:t>primary</a:t>
                       </a:r>
                       <a:r>
-                        <a:rPr lang="pt-BR" sz="1800" i="1" kern="1200" dirty="0" smtClean="0">
+                        <a:rPr lang="pt-BR" sz="1800" i="1" kern="1200" dirty="0">
                           <a:solidFill>
                             <a:schemeClr val="dk1"/>
                           </a:solidFill>
@@ -6330,7 +6333,7 @@
                         <a:t> </a:t>
                       </a:r>
                       <a:r>
-                        <a:rPr lang="pt-BR" sz="1800" i="1" kern="1200" dirty="0" err="1" smtClean="0">
+                        <a:rPr lang="pt-BR" sz="1800" i="1" kern="1200" dirty="0" err="1">
                           <a:solidFill>
                             <a:schemeClr val="dk1"/>
                           </a:solidFill>
@@ -6342,7 +6345,7 @@
                         <a:t>key</a:t>
                       </a:r>
                       <a:r>
-                        <a:rPr lang="pt-BR" sz="1800" kern="1200" dirty="0" smtClean="0">
+                        <a:rPr lang="pt-BR" sz="1800" kern="1200" dirty="0">
                           <a:solidFill>
                             <a:schemeClr val="dk1"/>
                           </a:solidFill>
@@ -6371,10 +6374,9 @@
                     <a:lstStyle/>
                     <a:p>
                       <a:r>
-                        <a:rPr lang="pt-BR" dirty="0" smtClean="0"/>
+                        <a:rPr lang="pt-BR" dirty="0"/>
                         <a:t>RF06</a:t>
                       </a:r>
-                      <a:endParaRPr lang="pt-BR" dirty="0"/>
                     </a:p>
                   </a:txBody>
                   <a:tcPr/>
@@ -6385,7 +6387,7 @@
                     <a:lstStyle/>
                     <a:p>
                       <a:r>
-                        <a:rPr lang="pt-BR" sz="1800" kern="1200" dirty="0" smtClean="0">
+                        <a:rPr lang="pt-BR" sz="1800" kern="1200" dirty="0">
                           <a:solidFill>
                             <a:schemeClr val="dk1"/>
                           </a:solidFill>
@@ -6396,7 +6398,6 @@
                         </a:rPr>
                         <a:t>O pagamento será confirmado pelo sistema quando o cliente realizar o pagamento em dinheiro ou cartão de sua preferência, atualizando os dados do pedido em seu cadastro adicionando assim ao histórico de compras realizadas e atualizando a quantidade de itens no estoque;</a:t>
                       </a:r>
-                      <a:endParaRPr lang="pt-BR" dirty="0"/>
                     </a:p>
                   </a:txBody>
                   <a:tcPr/>
@@ -6404,49 +6405,6 @@
                 <a:extLst>
                   <a:ext uri="{0D108BD9-81ED-4DB2-BD59-A6C34878D82A}">
                     <a16:rowId xmlns:a16="http://schemas.microsoft.com/office/drawing/2014/main" val="424311756"/>
-                  </a:ext>
-                </a:extLst>
-              </a:tr>
-              <a:tr h="266887">
-                <a:tc>
-                  <a:txBody>
-                    <a:bodyPr/>
-                    <a:lstStyle/>
-                    <a:p>
-                      <a:r>
-                        <a:rPr lang="pt-BR" dirty="0" smtClean="0"/>
-                        <a:t>RF07</a:t>
-                      </a:r>
-                      <a:endParaRPr lang="pt-BR" dirty="0"/>
-                    </a:p>
-                  </a:txBody>
-                  <a:tcPr/>
-                </a:tc>
-                <a:tc>
-                  <a:txBody>
-                    <a:bodyPr/>
-                    <a:lstStyle/>
-                    <a:p>
-                      <a:r>
-                        <a:rPr lang="pt-BR" sz="1800" kern="1200" dirty="0" smtClean="0">
-                          <a:solidFill>
-                            <a:schemeClr val="dk1"/>
-                          </a:solidFill>
-                          <a:effectLst/>
-                          <a:latin typeface="+mn-lt"/>
-                          <a:ea typeface="+mn-ea"/>
-                          <a:cs typeface="+mn-cs"/>
-                        </a:rPr>
-                        <a:t>O sistema permitirá o uso de mais de um cartão numa mesma compra, no máximo 3 cartões</a:t>
-                      </a:r>
-                      <a:endParaRPr lang="pt-BR" dirty="0"/>
-                    </a:p>
-                  </a:txBody>
-                  <a:tcPr/>
-                </a:tc>
-                <a:extLst>
-                  <a:ext uri="{0D108BD9-81ED-4DB2-BD59-A6C34878D82A}">
-                    <a16:rowId xmlns:a16="http://schemas.microsoft.com/office/drawing/2014/main" val="4048710610"/>
                   </a:ext>
                 </a:extLst>
               </a:tr>
@@ -6507,10 +6465,9 @@
           <a:lstStyle/>
           <a:p>
             <a:r>
-              <a:rPr lang="pt-BR" dirty="0" smtClean="0"/>
+              <a:rPr lang="pt-BR" dirty="0"/>
               <a:t>Demonstração de alguns requisitos NÃO funcionais encontrados</a:t>
             </a:r>
-            <a:endParaRPr lang="pt-BR" dirty="0"/>
           </a:p>
         </p:txBody>
       </p:sp>
@@ -6524,14 +6481,14 @@
             <p:ph idx="1"/>
             <p:extLst>
               <p:ext uri="{D42A27DB-BD31-4B8C-83A1-F6EECF244321}">
-                <p14:modId xmlns:p14="http://schemas.microsoft.com/office/powerpoint/2010/main" val="2167548049"/>
+                <p14:modId xmlns:p14="http://schemas.microsoft.com/office/powerpoint/2010/main" val="1637283415"/>
               </p:ext>
             </p:extLst>
           </p:nvPr>
         </p:nvGraphicFramePr>
         <p:xfrm>
-          <a:off x="685800" y="2103120"/>
-          <a:ext cx="10820400" cy="4121710"/>
+          <a:off x="747944" y="2040736"/>
+          <a:ext cx="10820400" cy="4023360"/>
         </p:xfrm>
         <a:graphic>
           <a:graphicData uri="http://schemas.openxmlformats.org/drawingml/2006/table">
@@ -6561,10 +6518,6 @@
                     <a:bodyPr/>
                     <a:lstStyle/>
                     <a:p>
-                      <a:r>
-                        <a:rPr lang="pt-BR" dirty="0" smtClean="0"/>
-                        <a:t>RF01</a:t>
-                      </a:r>
                       <a:endParaRPr lang="pt-BR" dirty="0"/>
                     </a:p>
                   </a:txBody>
@@ -6593,7 +6546,7 @@
                         <a:defRPr/>
                       </a:pPr>
                       <a:r>
-                        <a:rPr lang="pt-BR" sz="1800" b="1" kern="1200" dirty="0" smtClean="0">
+                        <a:rPr lang="pt-BR" sz="1800" b="1" kern="1200" dirty="0">
                           <a:solidFill>
                             <a:schemeClr val="lt1"/>
                           </a:solidFill>
@@ -6621,10 +6574,9 @@
                     <a:lstStyle/>
                     <a:p>
                       <a:r>
-                        <a:rPr lang="pt-BR" dirty="0" smtClean="0"/>
+                        <a:rPr lang="pt-BR" dirty="0"/>
                         <a:t>RNF01</a:t>
                       </a:r>
-                      <a:endParaRPr lang="pt-BR" dirty="0"/>
                     </a:p>
                   </a:txBody>
                   <a:tcPr/>
@@ -6652,7 +6604,7 @@
                         <a:defRPr/>
                       </a:pPr>
                       <a:r>
-                        <a:rPr lang="pt-BR" sz="1800" kern="1200" dirty="0" smtClean="0">
+                        <a:rPr lang="pt-BR" sz="1800" kern="1200" dirty="0">
                           <a:solidFill>
                             <a:schemeClr val="dk1"/>
                           </a:solidFill>
@@ -6661,31 +6613,7 @@
                           <a:ea typeface="+mn-ea"/>
                           <a:cs typeface="+mn-cs"/>
                         </a:rPr>
-                        <a:t>O sistema pede que o </a:t>
-                      </a:r>
-                      <a:r>
-                        <a:rPr lang="pt-BR" sz="1800" kern="1200" dirty="0" err="1" smtClean="0">
-                          <a:solidFill>
-                            <a:schemeClr val="dk1"/>
-                          </a:solidFill>
-                          <a:effectLst/>
-                          <a:latin typeface="+mn-lt"/>
-                          <a:ea typeface="+mn-ea"/>
-                          <a:cs typeface="+mn-cs"/>
-                        </a:rPr>
-                        <a:t>funcionario</a:t>
-                      </a:r>
-                      <a:r>
-                        <a:rPr lang="pt-BR" sz="1800" kern="1200" dirty="0" smtClean="0">
-                          <a:solidFill>
-                            <a:schemeClr val="dk1"/>
-                          </a:solidFill>
-                          <a:effectLst/>
-                          <a:latin typeface="+mn-lt"/>
-                          <a:ea typeface="+mn-ea"/>
-                          <a:cs typeface="+mn-cs"/>
-                        </a:rPr>
-                        <a:t> coloque uma senha de no mínimo 9 dígitos;</a:t>
+                        <a:t>O sistema deverá ter uma interface intuitiva e de fácil visualização para os funcionários</a:t>
                       </a:r>
                     </a:p>
                   </a:txBody>
@@ -6704,10 +6632,9 @@
                     <a:lstStyle/>
                     <a:p>
                       <a:r>
-                        <a:rPr lang="pt-BR" dirty="0" smtClean="0"/>
+                        <a:rPr lang="pt-BR" dirty="0"/>
                         <a:t>RNF02</a:t>
                       </a:r>
-                      <a:endParaRPr lang="pt-BR" dirty="0"/>
                     </a:p>
                   </a:txBody>
                   <a:tcPr/>
@@ -6718,7 +6645,7 @@
                     <a:lstStyle/>
                     <a:p>
                       <a:r>
-                        <a:rPr lang="pt-BR" sz="1800" kern="1200" dirty="0" smtClean="0">
+                        <a:rPr lang="pt-BR" sz="1800" kern="1200" dirty="0">
                           <a:solidFill>
                             <a:schemeClr val="dk1"/>
                           </a:solidFill>
@@ -6727,7 +6654,7 @@
                           <a:ea typeface="+mn-ea"/>
                           <a:cs typeface="+mn-cs"/>
                         </a:rPr>
-                        <a:t>A loja leva 1 dia para responder reclamações enviadas pelos clientes;</a:t>
+                        <a:t>Os pedidos poderão ser realizados com acesso a rede de internet, mas também terá a opção offline caso ocorra problemas, não comprometendo então a venda do produto.</a:t>
                       </a:r>
                       <a:endParaRPr lang="pt-BR" dirty="0"/>
                     </a:p>
@@ -6747,10 +6674,9 @@
                     <a:lstStyle/>
                     <a:p>
                       <a:r>
-                        <a:rPr lang="pt-BR" dirty="0" smtClean="0"/>
-                        <a:t>RNF04</a:t>
+                        <a:rPr lang="pt-BR" dirty="0"/>
+                        <a:t>RNF03</a:t>
                       </a:r>
-                      <a:endParaRPr lang="pt-BR" dirty="0"/>
                     </a:p>
                   </a:txBody>
                   <a:tcPr/>
@@ -6761,7 +6687,7 @@
                     <a:lstStyle/>
                     <a:p>
                       <a:r>
-                        <a:rPr lang="pt-BR" sz="1800" kern="1200" dirty="0" smtClean="0">
+                        <a:rPr lang="pt-BR" sz="1800" kern="1200" dirty="0">
                           <a:solidFill>
                             <a:schemeClr val="dk1"/>
                           </a:solidFill>
@@ -6770,31 +6696,7 @@
                           <a:ea typeface="+mn-ea"/>
                           <a:cs typeface="+mn-cs"/>
                         </a:rPr>
-                        <a:t>O </a:t>
-                      </a:r>
-                      <a:r>
-                        <a:rPr lang="pt-BR" sz="1800" kern="1200" dirty="0" err="1" smtClean="0">
-                          <a:solidFill>
-                            <a:schemeClr val="dk1"/>
-                          </a:solidFill>
-                          <a:effectLst/>
-                          <a:latin typeface="+mn-lt"/>
-                          <a:ea typeface="+mn-ea"/>
-                          <a:cs typeface="+mn-cs"/>
-                        </a:rPr>
-                        <a:t>login</a:t>
-                      </a:r>
-                      <a:r>
-                        <a:rPr lang="pt-BR" sz="1800" kern="1200" dirty="0" smtClean="0">
-                          <a:solidFill>
-                            <a:schemeClr val="dk1"/>
-                          </a:solidFill>
-                          <a:effectLst/>
-                          <a:latin typeface="+mn-lt"/>
-                          <a:ea typeface="+mn-ea"/>
-                          <a:cs typeface="+mn-cs"/>
-                        </a:rPr>
-                        <a:t> só pode ser cadastrado com letras e números, não permitimos símbolos;</a:t>
+                        <a:t>O Log dos pagamentos serão registrados num arquivo XML na máquina;</a:t>
                       </a:r>
                       <a:endParaRPr lang="pt-BR" dirty="0"/>
                     </a:p>
@@ -6814,10 +6716,9 @@
                     <a:lstStyle/>
                     <a:p>
                       <a:r>
-                        <a:rPr lang="pt-BR" dirty="0" smtClean="0"/>
-                        <a:t>RNF05</a:t>
+                        <a:rPr lang="pt-BR" dirty="0"/>
+                        <a:t>RNF04</a:t>
                       </a:r>
-                      <a:endParaRPr lang="pt-BR" dirty="0"/>
                     </a:p>
                   </a:txBody>
                   <a:tcPr/>
@@ -6828,7 +6729,7 @@
                     <a:lstStyle/>
                     <a:p>
                       <a:r>
-                        <a:rPr lang="pt-BR" sz="1800" kern="1200" dirty="0" smtClean="0">
+                        <a:rPr lang="pt-BR" sz="1800" kern="1200" dirty="0">
                           <a:solidFill>
                             <a:schemeClr val="dk1"/>
                           </a:solidFill>
@@ -6837,7 +6738,7 @@
                           <a:ea typeface="+mn-ea"/>
                           <a:cs typeface="+mn-cs"/>
                         </a:rPr>
-                        <a:t>O sistema de pedidos terá uma interface fácil visualização para o cliente e o funcionário;</a:t>
+                        <a:t>O sistema de credito permite pagamento em NFC ou aproximação;</a:t>
                       </a:r>
                       <a:endParaRPr lang="pt-BR" dirty="0"/>
                     </a:p>
@@ -6857,10 +6758,9 @@
                     <a:lstStyle/>
                     <a:p>
                       <a:r>
-                        <a:rPr lang="pt-BR" dirty="0" smtClean="0"/>
-                        <a:t>RNF06</a:t>
+                        <a:rPr lang="pt-BR" dirty="0"/>
+                        <a:t>RNF05</a:t>
                       </a:r>
-                      <a:endParaRPr lang="pt-BR" dirty="0"/>
                     </a:p>
                   </a:txBody>
                   <a:tcPr/>
@@ -6871,7 +6771,7 @@
                     <a:lstStyle/>
                     <a:p>
                       <a:r>
-                        <a:rPr lang="pt-BR" sz="1800" kern="1200" dirty="0" smtClean="0">
+                        <a:rPr lang="pt-BR" sz="1800" kern="1200" dirty="0">
                           <a:solidFill>
                             <a:schemeClr val="dk1"/>
                           </a:solidFill>
@@ -6880,7 +6780,7 @@
                           <a:ea typeface="+mn-ea"/>
                           <a:cs typeface="+mn-cs"/>
                         </a:rPr>
-                        <a:t>O sistema de credito permite pagamento em NFC ou aproximação ;</a:t>
+                        <a:t>O funcionário cadastrado no sistema deverá possuir uma senha de no mínimo 8 dígitos</a:t>
                       </a:r>
                       <a:endParaRPr lang="pt-BR" dirty="0"/>
                     </a:p>
@@ -6900,10 +6800,9 @@
                     <a:lstStyle/>
                     <a:p>
                       <a:r>
-                        <a:rPr lang="pt-BR" dirty="0" smtClean="0"/>
-                        <a:t>RNF07</a:t>
+                        <a:rPr lang="pt-BR" dirty="0"/>
+                        <a:t>RNF06</a:t>
                       </a:r>
-                      <a:endParaRPr lang="pt-BR" dirty="0"/>
                     </a:p>
                   </a:txBody>
                   <a:tcPr/>
@@ -6914,7 +6813,7 @@
                     <a:lstStyle/>
                     <a:p>
                       <a:r>
-                        <a:rPr lang="pt-BR" sz="1800" kern="1200" dirty="0" smtClean="0">
+                        <a:rPr lang="pt-BR" sz="1800" kern="1200" dirty="0">
                           <a:solidFill>
                             <a:schemeClr val="dk1"/>
                           </a:solidFill>
@@ -6923,7 +6822,7 @@
                           <a:ea typeface="+mn-ea"/>
                           <a:cs typeface="+mn-cs"/>
                         </a:rPr>
-                        <a:t>O funcionário pode ver quantos produtos ainda tem no estoque;</a:t>
+                        <a:t>O sistema poderá ter no máximo 5 acessos simultâneos</a:t>
                       </a:r>
                       <a:endParaRPr lang="pt-BR" dirty="0"/>
                     </a:p>
@@ -6943,10 +6842,9 @@
                     <a:lstStyle/>
                     <a:p>
                       <a:r>
-                        <a:rPr lang="pt-BR" dirty="0" smtClean="0"/>
-                        <a:t>RNF08</a:t>
+                        <a:rPr lang="pt-BR" dirty="0"/>
+                        <a:t>RNF07</a:t>
                       </a:r>
-                      <a:endParaRPr lang="pt-BR" dirty="0"/>
                     </a:p>
                   </a:txBody>
                   <a:tcPr/>
@@ -6957,7 +6855,7 @@
                     <a:lstStyle/>
                     <a:p>
                       <a:r>
-                        <a:rPr lang="pt-BR" sz="1800" kern="1200" dirty="0" smtClean="0">
+                        <a:rPr lang="pt-BR" sz="1800" kern="1200" dirty="0">
                           <a:solidFill>
                             <a:schemeClr val="dk1"/>
                           </a:solidFill>
@@ -6966,7 +6864,7 @@
                           <a:ea typeface="+mn-ea"/>
                           <a:cs typeface="+mn-cs"/>
                         </a:rPr>
-                        <a:t>O Funcionário tem acesso a todos os pedidos dos clientes;</a:t>
+                        <a:t>O login só pode ser cadastrado com letras e número, não permitindo símbolos</a:t>
                       </a:r>
                       <a:endParaRPr lang="pt-BR" dirty="0"/>
                     </a:p>
@@ -6976,92 +6874,6 @@
                 <a:extLst>
                   <a:ext uri="{0D108BD9-81ED-4DB2-BD59-A6C34878D82A}">
                     <a16:rowId xmlns:a16="http://schemas.microsoft.com/office/drawing/2014/main" val="644200053"/>
-                  </a:ext>
-                </a:extLst>
-              </a:tr>
-              <a:tr h="266887">
-                <a:tc>
-                  <a:txBody>
-                    <a:bodyPr/>
-                    <a:lstStyle/>
-                    <a:p>
-                      <a:r>
-                        <a:rPr lang="pt-BR" dirty="0" smtClean="0"/>
-                        <a:t>RNF09</a:t>
-                      </a:r>
-                      <a:endParaRPr lang="pt-BR" dirty="0"/>
-                    </a:p>
-                  </a:txBody>
-                  <a:tcPr/>
-                </a:tc>
-                <a:tc>
-                  <a:txBody>
-                    <a:bodyPr/>
-                    <a:lstStyle/>
-                    <a:p>
-                      <a:r>
-                        <a:rPr lang="pt-BR" sz="1800" kern="1200" dirty="0" smtClean="0">
-                          <a:solidFill>
-                            <a:schemeClr val="dk1"/>
-                          </a:solidFill>
-                          <a:effectLst/>
-                          <a:latin typeface="+mn-lt"/>
-                          <a:ea typeface="+mn-ea"/>
-                          <a:cs typeface="+mn-cs"/>
-                        </a:rPr>
-                        <a:t>Os pedidos poderão ser realizados off-line;</a:t>
-                      </a:r>
-                      <a:endParaRPr lang="pt-BR" dirty="0"/>
-                    </a:p>
-                  </a:txBody>
-                  <a:tcPr/>
-                </a:tc>
-                <a:extLst>
-                  <a:ext uri="{0D108BD9-81ED-4DB2-BD59-A6C34878D82A}">
-                    <a16:rowId xmlns:a16="http://schemas.microsoft.com/office/drawing/2014/main" val="424311756"/>
-                  </a:ext>
-                </a:extLst>
-              </a:tr>
-              <a:tr h="266887">
-                <a:tc>
-                  <a:txBody>
-                    <a:bodyPr/>
-                    <a:lstStyle/>
-                    <a:p>
-                      <a:r>
-                        <a:rPr lang="pt-BR" dirty="0" smtClean="0"/>
-                        <a:t>RNF10</a:t>
-                      </a:r>
-                      <a:endParaRPr lang="pt-BR" dirty="0"/>
-                    </a:p>
-                  </a:txBody>
-                  <a:tcPr/>
-                </a:tc>
-                <a:tc>
-                  <a:txBody>
-                    <a:bodyPr/>
-                    <a:lstStyle/>
-                    <a:p>
-                      <a:r>
-                        <a:rPr lang="pt-BR" sz="1800" kern="1200" dirty="0" smtClean="0">
-                          <a:solidFill>
-                            <a:schemeClr val="dk1"/>
-                          </a:solidFill>
-                          <a:effectLst/>
-                          <a:latin typeface="+mn-lt"/>
-                          <a:ea typeface="+mn-ea"/>
-                          <a:cs typeface="+mn-cs"/>
-                        </a:rPr>
-                        <a:t>O log dos pagamentos serão registrados num arquivo de texto na máquina;</a:t>
-                      </a:r>
-                      <a:endParaRPr lang="pt-BR" dirty="0"/>
-                    </a:p>
-                  </a:txBody>
-                  <a:tcPr/>
-                </a:tc>
-                <a:extLst>
-                  <a:ext uri="{0D108BD9-81ED-4DB2-BD59-A6C34878D82A}">
-                    <a16:rowId xmlns:a16="http://schemas.microsoft.com/office/drawing/2014/main" val="4048710610"/>
                   </a:ext>
                 </a:extLst>
               </a:tr>
@@ -7115,16 +6927,16 @@
           <a:lstStyle/>
           <a:p>
             <a:r>
-              <a:rPr lang="pt-BR" dirty="0" smtClean="0"/>
+              <a:rPr lang="pt-BR" dirty="0"/>
               <a:t>Prioridades para próxima </a:t>
             </a:r>
             <a:r>
-              <a:rPr lang="pt-BR" dirty="0" err="1" smtClean="0"/>
-              <a:t>sprint</a:t>
+              <a:rPr lang="pt-BR" i="1" dirty="0"/>
+              <a:t>sprin</a:t>
             </a:r>
             <a:r>
               <a:rPr lang="pt-BR" dirty="0"/>
-              <a:t>	</a:t>
+              <a:t>t	</a:t>
             </a:r>
           </a:p>
         </p:txBody>
@@ -7145,16 +6957,15 @@
           <a:lstStyle/>
           <a:p>
             <a:r>
-              <a:rPr lang="pt-BR" dirty="0" smtClean="0"/>
+              <a:rPr lang="pt-BR" dirty="0"/>
               <a:t>Impacto na Organização</a:t>
             </a:r>
           </a:p>
           <a:p>
             <a:r>
-              <a:rPr lang="pt-BR" dirty="0" smtClean="0"/>
+              <a:rPr lang="pt-BR" dirty="0"/>
               <a:t>Casos de Uso</a:t>
             </a:r>
-            <a:endParaRPr lang="pt-BR" dirty="0"/>
           </a:p>
         </p:txBody>
       </p:sp>

</xml_diff>